<commit_message>
update May 2020 report
</commit_message>
<xml_diff>
--- a/results/presentations/2020/May/monthly_reportMay2020.pptx
+++ b/results/presentations/2020/May/monthly_reportMay2020.pptx
@@ -3761,7 +3761,7 @@
           <a:p>
             <a:r>
               <a:rPr/>
-              <a:t>Cental West End High Cost Permits</a:t>
+              <a:t>Cental West End Permit Cost Breakdown</a:t>
             </a:r>
           </a:p>
         </p:txBody>
@@ -6497,7 +6497,7 @@
           <a:p>
             <a:r>
               <a:rPr/>
-              <a:t>DeBaliviere Place High Cost Permits</a:t>
+              <a:t>DeBaliviere Place Permit Cost Breakdown</a:t>
             </a:r>
           </a:p>
         </p:txBody>
@@ -11045,7 +11045,7 @@
           <a:p>
             <a:r>
               <a:rPr/>
-              <a:t>Skinker DeBaliviere High Cost Permits</a:t>
+              <a:t>Skinker DeBaliviere Permit Cost Breakdown</a:t>
             </a:r>
           </a:p>
         </p:txBody>
@@ -12765,7 +12765,7 @@
           <a:p>
             <a:r>
               <a:rPr/>
-              <a:t>West End High Cost Permits</a:t>
+              <a:t>West End Permit Cost Breakdown</a:t>
             </a:r>
           </a:p>
         </p:txBody>
@@ -14574,7 +14574,7 @@
           <a:p>
             <a:r>
               <a:rPr/>
-              <a:t>Academy High Cost Permits</a:t>
+              <a:t>Academy Permit Cost Breakdown</a:t>
             </a:r>
           </a:p>
         </p:txBody>
@@ -16040,7 +16040,7 @@
           <a:p>
             <a:r>
               <a:rPr/>
-              <a:t>Fountain Park High Cost Permits</a:t>
+              <a:t>Fountain Park Permit Cost Breakdown</a:t>
             </a:r>
           </a:p>
         </p:txBody>
@@ -20012,7 +20012,7 @@
           <a:p>
             <a:r>
               <a:rPr/>
-              <a:t>Vandeventer High Cost Permits</a:t>
+              <a:t>Vandeventer Permit Cost Breakdown</a:t>
             </a:r>
           </a:p>
         </p:txBody>
@@ -23473,7 +23473,7 @@
           <a:p>
             <a:r>
               <a:rPr/>
-              <a:t>Forest Park Southeast High Cost Permits</a:t>
+              <a:t>Forest Park Southeast Permit Cost Breakdown</a:t>
             </a:r>
           </a:p>
         </p:txBody>

</xml_diff>